<commit_message>
Mass balance function corrected
Qreg_rel[t] = np.array([Qreg_rel[t], s[t] - s_min + I[t] + Qreg_inf[t] - E[t] - env[t]]).max()

was replaced by

Qreg_rel[t] = np.array([Qreg_rel[t], s[t] - s_min + I[t] + Qreg_inf[t] - E[t] - env[t]]).min()
</commit_message>
<xml_diff>
--- a/Toolbox/Reservoir_system_simulation/Res_sys_sim_diagram.pptx
+++ b/Toolbox/Reservoir_system_simulation/Res_sys_sim_diagram.pptx
@@ -125,12 +125,12 @@
   <pc:docChgLst>
     <pc:chgData name="Andres Penuela-Fernandez" userId="26693260-5f72-4911-8218-b098c180f1d5" providerId="ADAL" clId="{BC06EF19-1559-4B52-8E5C-04BEE9A72503}"/>
     <pc:docChg chg="undo redo custSel addSld delSld modSld modMainMaster">
-      <pc:chgData name="Andres Penuela-Fernandez" userId="26693260-5f72-4911-8218-b098c180f1d5" providerId="ADAL" clId="{BC06EF19-1559-4B52-8E5C-04BEE9A72503}" dt="2020-01-14T17:27:20.818" v="2415" actId="14100"/>
+      <pc:chgData name="Andres Penuela-Fernandez" userId="26693260-5f72-4911-8218-b098c180f1d5" providerId="ADAL" clId="{BC06EF19-1559-4B52-8E5C-04BEE9A72503}" dt="2020-01-20T16:34:26.326" v="2419" actId="20577"/>
       <pc:docMkLst>
         <pc:docMk/>
       </pc:docMkLst>
       <pc:sldChg chg="addSp delSp modSp setBg">
-        <pc:chgData name="Andres Penuela-Fernandez" userId="26693260-5f72-4911-8218-b098c180f1d5" providerId="ADAL" clId="{BC06EF19-1559-4B52-8E5C-04BEE9A72503}" dt="2020-01-14T17:27:20.818" v="2415" actId="14100"/>
+        <pc:chgData name="Andres Penuela-Fernandez" userId="26693260-5f72-4911-8218-b098c180f1d5" providerId="ADAL" clId="{BC06EF19-1559-4B52-8E5C-04BEE9A72503}" dt="2020-01-20T16:34:26.326" v="2419" actId="20577"/>
         <pc:sldMkLst>
           <pc:docMk/>
           <pc:sldMk cId="3747394284" sldId="256"/>
@@ -704,7 +704,7 @@
           </ac:spMkLst>
         </pc:spChg>
         <pc:spChg chg="add mod">
-          <ac:chgData name="Andres Penuela-Fernandez" userId="26693260-5f72-4911-8218-b098c180f1d5" providerId="ADAL" clId="{BC06EF19-1559-4B52-8E5C-04BEE9A72503}" dt="2020-01-14T15:50:59.550" v="2377" actId="5793"/>
+          <ac:chgData name="Andres Penuela-Fernandez" userId="26693260-5f72-4911-8218-b098c180f1d5" providerId="ADAL" clId="{BC06EF19-1559-4B52-8E5C-04BEE9A72503}" dt="2020-01-20T16:34:26.326" v="2419" actId="20577"/>
           <ac:spMkLst>
             <pc:docMk/>
             <pc:sldMk cId="3747394284" sldId="256"/>
@@ -2717,7 +2717,7 @@
           <a:p>
             <a:fld id="{2F40FEF2-4AE0-4218-8FE5-D4A1005FB922}" type="datetimeFigureOut">
               <a:rPr lang="es-ES" smtClean="0"/>
-              <a:t>14/01/2020</a:t>
+              <a:t>20/01/2020</a:t>
             </a:fld>
             <a:endParaRPr lang="es-ES"/>
           </a:p>
@@ -2887,7 +2887,7 @@
           <a:p>
             <a:fld id="{2F40FEF2-4AE0-4218-8FE5-D4A1005FB922}" type="datetimeFigureOut">
               <a:rPr lang="es-ES" smtClean="0"/>
-              <a:t>14/01/2020</a:t>
+              <a:t>20/01/2020</a:t>
             </a:fld>
             <a:endParaRPr lang="es-ES"/>
           </a:p>
@@ -3067,7 +3067,7 @@
           <a:p>
             <a:fld id="{2F40FEF2-4AE0-4218-8FE5-D4A1005FB922}" type="datetimeFigureOut">
               <a:rPr lang="es-ES" smtClean="0"/>
-              <a:t>14/01/2020</a:t>
+              <a:t>20/01/2020</a:t>
             </a:fld>
             <a:endParaRPr lang="es-ES"/>
           </a:p>
@@ -3237,7 +3237,7 @@
           <a:p>
             <a:fld id="{2F40FEF2-4AE0-4218-8FE5-D4A1005FB922}" type="datetimeFigureOut">
               <a:rPr lang="es-ES" smtClean="0"/>
-              <a:t>14/01/2020</a:t>
+              <a:t>20/01/2020</a:t>
             </a:fld>
             <a:endParaRPr lang="es-ES"/>
           </a:p>
@@ -3481,7 +3481,7 @@
           <a:p>
             <a:fld id="{2F40FEF2-4AE0-4218-8FE5-D4A1005FB922}" type="datetimeFigureOut">
               <a:rPr lang="es-ES" smtClean="0"/>
-              <a:t>14/01/2020</a:t>
+              <a:t>20/01/2020</a:t>
             </a:fld>
             <a:endParaRPr lang="es-ES"/>
           </a:p>
@@ -3713,7 +3713,7 @@
           <a:p>
             <a:fld id="{2F40FEF2-4AE0-4218-8FE5-D4A1005FB922}" type="datetimeFigureOut">
               <a:rPr lang="es-ES" smtClean="0"/>
-              <a:t>14/01/2020</a:t>
+              <a:t>20/01/2020</a:t>
             </a:fld>
             <a:endParaRPr lang="es-ES"/>
           </a:p>
@@ -4080,7 +4080,7 @@
           <a:p>
             <a:fld id="{2F40FEF2-4AE0-4218-8FE5-D4A1005FB922}" type="datetimeFigureOut">
               <a:rPr lang="es-ES" smtClean="0"/>
-              <a:t>14/01/2020</a:t>
+              <a:t>20/01/2020</a:t>
             </a:fld>
             <a:endParaRPr lang="es-ES"/>
           </a:p>
@@ -4198,7 +4198,7 @@
           <a:p>
             <a:fld id="{2F40FEF2-4AE0-4218-8FE5-D4A1005FB922}" type="datetimeFigureOut">
               <a:rPr lang="es-ES" smtClean="0"/>
-              <a:t>14/01/2020</a:t>
+              <a:t>20/01/2020</a:t>
             </a:fld>
             <a:endParaRPr lang="es-ES"/>
           </a:p>
@@ -4293,7 +4293,7 @@
           <a:p>
             <a:fld id="{2F40FEF2-4AE0-4218-8FE5-D4A1005FB922}" type="datetimeFigureOut">
               <a:rPr lang="es-ES" smtClean="0"/>
-              <a:t>14/01/2020</a:t>
+              <a:t>20/01/2020</a:t>
             </a:fld>
             <a:endParaRPr lang="es-ES"/>
           </a:p>
@@ -4570,7 +4570,7 @@
           <a:p>
             <a:fld id="{2F40FEF2-4AE0-4218-8FE5-D4A1005FB922}" type="datetimeFigureOut">
               <a:rPr lang="es-ES" smtClean="0"/>
-              <a:t>14/01/2020</a:t>
+              <a:t>20/01/2020</a:t>
             </a:fld>
             <a:endParaRPr lang="es-ES"/>
           </a:p>
@@ -4827,7 +4827,7 @@
           <a:p>
             <a:fld id="{2F40FEF2-4AE0-4218-8FE5-D4A1005FB922}" type="datetimeFigureOut">
               <a:rPr lang="es-ES" smtClean="0"/>
-              <a:t>14/01/2020</a:t>
+              <a:t>20/01/2020</a:t>
             </a:fld>
             <a:endParaRPr lang="es-ES"/>
           </a:p>
@@ -5040,7 +5040,7 @@
           <a:p>
             <a:fld id="{2F40FEF2-4AE0-4218-8FE5-D4A1005FB922}" type="datetimeFigureOut">
               <a:rPr lang="es-ES" smtClean="0"/>
-              <a:t>14/01/2020</a:t>
+              <a:t>20/01/2020</a:t>
             </a:fld>
             <a:endParaRPr lang="es-ES"/>
           </a:p>
@@ -8877,7 +8877,7 @@
               <a:rPr lang="pt-PT" sz="2000" dirty="0">
                 <a:cs typeface="Times New Roman" panose="02020603050405020304" pitchFamily="18" charset="0"/>
               </a:rPr>
-              <a:t>= max(Q</a:t>
+              <a:t>= min(Q</a:t>
             </a:r>
             <a:r>
               <a:rPr lang="pt-PT" sz="2000" baseline="-25000" dirty="0">
@@ -10238,6 +10238,21 @@
 </file>
 
 <file path=customXml/item1.xml><?xml version="1.0" encoding="utf-8"?>
+<p:properties xmlns:p="http://schemas.microsoft.com/office/2006/metadata/properties" xmlns:xsi="http://www.w3.org/2001/XMLSchema-instance" xmlns:pc="http://schemas.microsoft.com/office/infopath/2007/PartnerControls">
+  <documentManagement/>
+</p:properties>
+</file>
+
+<file path=customXml/item2.xml><?xml version="1.0" encoding="utf-8"?>
+<?mso-contentType ?>
+<FormTemplates xmlns="http://schemas.microsoft.com/sharepoint/v3/contenttype/forms">
+  <Display>DocumentLibraryForm</Display>
+  <Edit>DocumentLibraryForm</Edit>
+  <New>DocumentLibraryForm</New>
+</FormTemplates>
+</file>
+
+<file path=customXml/item3.xml><?xml version="1.0" encoding="utf-8"?>
 <ct:contentTypeSchema xmlns:ct="http://schemas.microsoft.com/office/2006/metadata/contentType" xmlns:ma="http://schemas.microsoft.com/office/2006/metadata/properties/metaAttributes" ct:_="" ma:_="" ma:contentTypeName="Document" ma:contentTypeID="0x01010018920285DC5D0A44AC8601D5F5FCB028" ma:contentTypeVersion="11" ma:contentTypeDescription="Create a new document." ma:contentTypeScope="" ma:versionID="69f7994a722bf0f5628e75679f2f9f6b">
   <xsd:schema xmlns:xsd="http://www.w3.org/2001/XMLSchema" xmlns:xs="http://www.w3.org/2001/XMLSchema" xmlns:p="http://schemas.microsoft.com/office/2006/metadata/properties" xmlns:ns3="2c647de3-82f5-437f-9bca-4c0720ec6ea7" xmlns:ns4="69462d87-eed6-49f7-986f-3b5d633957bd" targetNamespace="http://schemas.microsoft.com/office/2006/metadata/properties" ma:root="true" ma:fieldsID="184fe2c64c94f5caf06d48f7d7f4bc86" ns3:_="" ns4:_="">
     <xsd:import namespace="2c647de3-82f5-437f-9bca-4c0720ec6ea7"/>
@@ -10446,22 +10461,24 @@
 </ct:contentTypeSchema>
 </file>
 
-<file path=customXml/item2.xml><?xml version="1.0" encoding="utf-8"?>
-<?mso-contentType ?>
-<FormTemplates xmlns="http://schemas.microsoft.com/sharepoint/v3/contenttype/forms">
-  <Display>DocumentLibraryForm</Display>
-  <Edit>DocumentLibraryForm</Edit>
-  <New>DocumentLibraryForm</New>
-</FormTemplates>
+<file path=customXml/itemProps1.xml><?xml version="1.0" encoding="utf-8"?>
+<ds:datastoreItem xmlns:ds="http://schemas.openxmlformats.org/officeDocument/2006/customXml" ds:itemID="{553B0F03-FB37-4F95-A28F-90120812498D}">
+  <ds:schemaRefs>
+    <ds:schemaRef ds:uri="http://schemas.microsoft.com/office/2006/metadata/properties"/>
+    <ds:schemaRef ds:uri="http://schemas.microsoft.com/office/infopath/2007/PartnerControls"/>
+  </ds:schemaRefs>
+</ds:datastoreItem>
 </file>
 
-<file path=customXml/item3.xml><?xml version="1.0" encoding="utf-8"?>
-<p:properties xmlns:p="http://schemas.microsoft.com/office/2006/metadata/properties" xmlns:xsi="http://www.w3.org/2001/XMLSchema-instance" xmlns:pc="http://schemas.microsoft.com/office/infopath/2007/PartnerControls">
-  <documentManagement/>
-</p:properties>
+<file path=customXml/itemProps2.xml><?xml version="1.0" encoding="utf-8"?>
+<ds:datastoreItem xmlns:ds="http://schemas.openxmlformats.org/officeDocument/2006/customXml" ds:itemID="{552A1BB4-5EF2-46C6-86A2-4C8E1D91BCE9}">
+  <ds:schemaRefs>
+    <ds:schemaRef ds:uri="http://schemas.microsoft.com/sharepoint/v3/contenttype/forms"/>
+  </ds:schemaRefs>
+</ds:datastoreItem>
 </file>
 
-<file path=customXml/itemProps1.xml><?xml version="1.0" encoding="utf-8"?>
+<file path=customXml/itemProps3.xml><?xml version="1.0" encoding="utf-8"?>
 <ds:datastoreItem xmlns:ds="http://schemas.openxmlformats.org/officeDocument/2006/customXml" ds:itemID="{02B013BA-C24E-4F13-A868-BDF53AC47E34}">
   <ds:schemaRefs>
     <ds:schemaRef ds:uri="http://schemas.microsoft.com/office/2006/metadata/contentType"/>
@@ -10478,21 +10495,4 @@
     <ds:schemaRef ds:uri="http://schemas.microsoft.com/internal/obd"/>
   </ds:schemaRefs>
 </ds:datastoreItem>
-</file>
-
-<file path=customXml/itemProps2.xml><?xml version="1.0" encoding="utf-8"?>
-<ds:datastoreItem xmlns:ds="http://schemas.openxmlformats.org/officeDocument/2006/customXml" ds:itemID="{552A1BB4-5EF2-46C6-86A2-4C8E1D91BCE9}">
-  <ds:schemaRefs>
-    <ds:schemaRef ds:uri="http://schemas.microsoft.com/sharepoint/v3/contenttype/forms"/>
-  </ds:schemaRefs>
-</ds:datastoreItem>
-</file>
-
-<file path=customXml/itemProps3.xml><?xml version="1.0" encoding="utf-8"?>
-<ds:datastoreItem xmlns:ds="http://schemas.openxmlformats.org/officeDocument/2006/customXml" ds:itemID="{553B0F03-FB37-4F95-A28F-90120812498D}">
-  <ds:schemaRefs>
-    <ds:schemaRef ds:uri="http://schemas.microsoft.com/office/2006/metadata/properties"/>
-    <ds:schemaRef ds:uri="http://schemas.microsoft.com/office/infopath/2007/PartnerControls"/>
-  </ds:schemaRefs>
-</ds:datastoreItem>
 </file>
</xml_diff>